<commit_message>
Update Revision_Examples on Linear Equations - EE 202.pptx
</commit_message>
<xml_diff>
--- a/PP WORK/Instructor Version/Week 3/Revision_Examples on Linear Equations - EE 202.pptx
+++ b/PP WORK/Instructor Version/Week 3/Revision_Examples on Linear Equations - EE 202.pptx
@@ -118,7 +118,7 @@
   </p:defaultTextStyle>
   <p:extLst>
     <p:ext uri="{EFAFB233-063F-42B5-8137-9DF3F51BA10A}">
-      <p15:sldGuideLst xmlns:p15="http://schemas.microsoft.com/office/powerpoint/2012/main"/>
+      <p15:sldGuideLst xmlns:p15="http://schemas.microsoft.com/office/powerpoint/2012/main" xmlns=""/>
     </p:ext>
   </p:extLst>
 </p:presentation>
@@ -127,11 +127,7 @@
 <file path=ppt/commentAuthors.xml><?xml version="1.0" encoding="utf-8"?>
 <p:cmAuthorLst xmlns:a="http://schemas.openxmlformats.org/drawingml/2006/main" xmlns:r="http://schemas.openxmlformats.org/officeDocument/2006/relationships" xmlns:p="http://schemas.openxmlformats.org/presentationml/2006/main">
   <p:cmAuthor id="1" name="Mohammad Abdolmaleki" initials="MA" lastIdx="38" clrIdx="0">
-    <p:extLst>
-      <p:ext uri="{19B8F6BF-5375-455C-9EA6-DF929625EA0E}">
-        <p15:presenceInfo xmlns:p15="http://schemas.microsoft.com/office/powerpoint/2012/main" userId="S-1-5-21-3217185839-3634796212-1114009176-62922" providerId="AD"/>
-      </p:ext>
-    </p:extLst>
+    <p:extLst/>
   </p:cmAuthor>
 </p:cmAuthorLst>
 </file>
@@ -218,7 +214,7 @@
           <a:p>
             <a:fld id="{18AB4343-410D-4114-8175-E2D7C9308D80}" type="datetimeFigureOut">
               <a:rPr lang="en-US" smtClean="0"/>
-              <a:t>7/17/2023</a:t>
+              <a:t>1/13/2025</a:t>
             </a:fld>
             <a:endParaRPr lang="en-US"/>
           </a:p>
@@ -614,7 +610,7 @@
           <a:p>
             <a:fld id="{3138BA51-D3EA-CD41-976F-9A9696589CDF}" type="datetimeFigureOut">
               <a:rPr lang="en-US" smtClean="0"/>
-              <a:t>7/17/2023</a:t>
+              <a:t>1/13/2025</a:t>
             </a:fld>
             <a:endParaRPr lang="en-US"/>
           </a:p>
@@ -782,7 +778,7 @@
           <a:p>
             <a:fld id="{3138BA51-D3EA-CD41-976F-9A9696589CDF}" type="datetimeFigureOut">
               <a:rPr lang="en-US" smtClean="0"/>
-              <a:t>7/17/2023</a:t>
+              <a:t>1/13/2025</a:t>
             </a:fld>
             <a:endParaRPr lang="en-US"/>
           </a:p>
@@ -960,7 +956,7 @@
           <a:p>
             <a:fld id="{3138BA51-D3EA-CD41-976F-9A9696589CDF}" type="datetimeFigureOut">
               <a:rPr lang="en-US" smtClean="0"/>
-              <a:t>7/17/2023</a:t>
+              <a:t>1/13/2025</a:t>
             </a:fld>
             <a:endParaRPr lang="en-US"/>
           </a:p>
@@ -1128,7 +1124,7 @@
           <a:p>
             <a:fld id="{3138BA51-D3EA-CD41-976F-9A9696589CDF}" type="datetimeFigureOut">
               <a:rPr lang="en-US" smtClean="0"/>
-              <a:t>7/17/2023</a:t>
+              <a:t>1/13/2025</a:t>
             </a:fld>
             <a:endParaRPr lang="en-US"/>
           </a:p>
@@ -1373,7 +1369,7 @@
           <a:p>
             <a:fld id="{3138BA51-D3EA-CD41-976F-9A9696589CDF}" type="datetimeFigureOut">
               <a:rPr lang="en-US" smtClean="0"/>
-              <a:t>7/17/2023</a:t>
+              <a:t>1/13/2025</a:t>
             </a:fld>
             <a:endParaRPr lang="en-US"/>
           </a:p>
@@ -1602,7 +1598,7 @@
           <a:p>
             <a:fld id="{3138BA51-D3EA-CD41-976F-9A9696589CDF}" type="datetimeFigureOut">
               <a:rPr lang="en-US" smtClean="0"/>
-              <a:t>7/17/2023</a:t>
+              <a:t>1/13/2025</a:t>
             </a:fld>
             <a:endParaRPr lang="en-US"/>
           </a:p>
@@ -1966,7 +1962,7 @@
           <a:p>
             <a:fld id="{3138BA51-D3EA-CD41-976F-9A9696589CDF}" type="datetimeFigureOut">
               <a:rPr lang="en-US" smtClean="0"/>
-              <a:t>7/17/2023</a:t>
+              <a:t>1/13/2025</a:t>
             </a:fld>
             <a:endParaRPr lang="en-US"/>
           </a:p>
@@ -2083,7 +2079,7 @@
           <a:p>
             <a:fld id="{3138BA51-D3EA-CD41-976F-9A9696589CDF}" type="datetimeFigureOut">
               <a:rPr lang="en-US" smtClean="0"/>
-              <a:t>7/17/2023</a:t>
+              <a:t>1/13/2025</a:t>
             </a:fld>
             <a:endParaRPr lang="en-US"/>
           </a:p>
@@ -2178,7 +2174,7 @@
           <a:p>
             <a:fld id="{3138BA51-D3EA-CD41-976F-9A9696589CDF}" type="datetimeFigureOut">
               <a:rPr lang="en-US" smtClean="0"/>
-              <a:t>7/17/2023</a:t>
+              <a:t>1/13/2025</a:t>
             </a:fld>
             <a:endParaRPr lang="en-US"/>
           </a:p>
@@ -2453,7 +2449,7 @@
           <a:p>
             <a:fld id="{3138BA51-D3EA-CD41-976F-9A9696589CDF}" type="datetimeFigureOut">
               <a:rPr lang="en-US" smtClean="0"/>
-              <a:t>7/17/2023</a:t>
+              <a:t>1/13/2025</a:t>
             </a:fld>
             <a:endParaRPr lang="en-US"/>
           </a:p>
@@ -2705,7 +2701,7 @@
           <a:p>
             <a:fld id="{3138BA51-D3EA-CD41-976F-9A9696589CDF}" type="datetimeFigureOut">
               <a:rPr lang="en-US" smtClean="0"/>
-              <a:t>7/17/2023</a:t>
+              <a:t>1/13/2025</a:t>
             </a:fld>
             <a:endParaRPr lang="en-US"/>
           </a:p>
@@ -2925,7 +2921,7 @@
           <a:p>
             <a:fld id="{3138BA51-D3EA-CD41-976F-9A9696589CDF}" type="datetimeFigureOut">
               <a:rPr lang="en-US" smtClean="0"/>
-              <a:t>7/17/2023</a:t>
+              <a:t>1/13/2025</a:t>
             </a:fld>
             <a:endParaRPr lang="en-US"/>
           </a:p>
@@ -3335,7 +3331,7 @@
           <p:cNvPr id="2" name="Title 1">
             <a:extLst>
               <a:ext uri="{FF2B5EF4-FFF2-40B4-BE49-F238E27FC236}">
-                <a16:creationId xmlns:a16="http://schemas.microsoft.com/office/drawing/2014/main" id="{ECCBC8A2-EF3D-1041-BD61-E0B1E1DB35A8}"/>
+                <a16:creationId xmlns:a16="http://schemas.microsoft.com/office/drawing/2014/main" xmlns="" id="{ECCBC8A2-EF3D-1041-BD61-E0B1E1DB35A8}"/>
               </a:ext>
             </a:extLst>
           </p:cNvPr>
@@ -3367,7 +3363,7 @@
           <p:cNvPr id="3" name="Subtitle 2">
             <a:extLst>
               <a:ext uri="{FF2B5EF4-FFF2-40B4-BE49-F238E27FC236}">
-                <a16:creationId xmlns:a16="http://schemas.microsoft.com/office/drawing/2014/main" id="{9DAB2B41-7431-1B4F-B7C8-30CAE64FD2D3}"/>
+                <a16:creationId xmlns:a16="http://schemas.microsoft.com/office/drawing/2014/main" xmlns="" id="{9DAB2B41-7431-1B4F-B7C8-30CAE64FD2D3}"/>
               </a:ext>
             </a:extLst>
           </p:cNvPr>
@@ -3461,14 +3457,14 @@
           <a:chExt cx="0" cy="0"/>
         </a:xfrm>
       </p:grpSpPr>
-      <mc:AlternateContent xmlns:mc="http://schemas.openxmlformats.org/markup-compatibility/2006">
-        <mc:Choice xmlns:a14="http://schemas.microsoft.com/office/drawing/2010/main" Requires="a14">
+      <mc:AlternateContent xmlns:mc="http://schemas.openxmlformats.org/markup-compatibility/2006" xmlns:a14="http://schemas.microsoft.com/office/drawing/2010/main">
+        <mc:Choice Requires="a14">
           <p:sp>
             <p:nvSpPr>
               <p:cNvPr id="2" name="Rectangle 1">
                 <a:extLst>
                   <a:ext uri="{FF2B5EF4-FFF2-40B4-BE49-F238E27FC236}">
-                    <a16:creationId xmlns:a16="http://schemas.microsoft.com/office/drawing/2014/main" id="{071192AE-575C-C443-84ED-060AE85A6C46}"/>
+                    <a16:creationId xmlns:a16="http://schemas.microsoft.com/office/drawing/2014/main" xmlns="" id="{071192AE-575C-C443-84ED-060AE85A6C46}"/>
                   </a:ext>
                 </a:extLst>
               </p:cNvPr>
@@ -3888,15 +3884,7 @@
                         <a:ea typeface="Calibri" panose="020F0502020204030204" pitchFamily="34" charset="0"/>
                         <a:cs typeface="Arial" panose="020B0604020202020204" pitchFamily="34" charset="0"/>
                       </a:rPr>
-                      <m:t>=</m:t>
-                    </m:r>
-                    <m:r>
-                      <a:rPr lang="en-US" sz="2800" b="1" i="1">
-                        <a:latin typeface="Cambria Math" panose="02040503050406030204" pitchFamily="18" charset="0"/>
-                        <a:ea typeface="Calibri" panose="020F0502020204030204" pitchFamily="34" charset="0"/>
-                        <a:cs typeface="Arial" panose="020B0604020202020204" pitchFamily="34" charset="0"/>
-                      </a:rPr>
-                      <m:t>−</m:t>
+                      <m:t>=−</m:t>
                     </m:r>
                     <m:r>
                       <a:rPr lang="en-US" sz="2800" b="1" i="1">
@@ -4100,7 +4088,7 @@
                       <m:fPr>
                         <m:ctrlPr>
                           <a:rPr lang="en-US" sz="2800" b="1" i="1" dirty="0" smtClean="0">
-                            <a:latin typeface="Cambria Math" panose="02040503050406030204" pitchFamily="18" charset="0"/>
+                            <a:latin typeface="Cambria Math"/>
                             <a:cs typeface="Arial" panose="020B0604020202020204" pitchFamily="34" charset="0"/>
                           </a:rPr>
                         </m:ctrlPr>
@@ -4152,7 +4140,7 @@
                       <m:fPr>
                         <m:ctrlPr>
                           <a:rPr lang="en-US" sz="2800" b="1" i="1" smtClean="0">
-                            <a:latin typeface="Cambria Math" panose="02040503050406030204" pitchFamily="18" charset="0"/>
+                            <a:latin typeface="Cambria Math"/>
                             <a:cs typeface="Arial" panose="020B0604020202020204" pitchFamily="34" charset="0"/>
                           </a:rPr>
                         </m:ctrlPr>
@@ -4246,7 +4234,7 @@
                       <m:fPr>
                         <m:ctrlPr>
                           <a:rPr lang="en-US" sz="2800" b="1" i="1" smtClean="0">
-                            <a:latin typeface="Cambria Math" panose="02040503050406030204" pitchFamily="18" charset="0"/>
+                            <a:latin typeface="Cambria Math"/>
                             <a:cs typeface="Arial" panose="020B0604020202020204" pitchFamily="34" charset="0"/>
                           </a:rPr>
                         </m:ctrlPr>
@@ -4512,7 +4500,7 @@
                       <m:fPr>
                         <m:ctrlPr>
                           <a:rPr lang="en-US" sz="2800" b="0" i="1" dirty="0" smtClean="0">
-                            <a:latin typeface="Cambria Math" panose="02040503050406030204" pitchFamily="18" charset="0"/>
+                            <a:latin typeface="Cambria Math"/>
                             <a:cs typeface="Arial" panose="020B0604020202020204" pitchFamily="34" charset="0"/>
                           </a:rPr>
                         </m:ctrlPr>
@@ -4547,7 +4535,7 @@
             </p:txBody>
           </p:sp>
         </mc:Choice>
-        <mc:Fallback>
+        <mc:Fallback xmlns="">
           <p:sp>
             <p:nvSpPr>
               <p:cNvPr id="2" name="Rectangle 1">
@@ -4622,14 +4610,14 @@
           <a:chExt cx="0" cy="0"/>
         </a:xfrm>
       </p:grpSpPr>
-      <mc:AlternateContent xmlns:mc="http://schemas.openxmlformats.org/markup-compatibility/2006">
-        <mc:Choice xmlns:a14="http://schemas.microsoft.com/office/drawing/2010/main" Requires="a14">
+      <mc:AlternateContent xmlns:mc="http://schemas.openxmlformats.org/markup-compatibility/2006" xmlns:a14="http://schemas.microsoft.com/office/drawing/2010/main">
+        <mc:Choice Requires="a14">
           <p:sp>
             <p:nvSpPr>
               <p:cNvPr id="2" name="Rectangle 1">
                 <a:extLst>
                   <a:ext uri="{FF2B5EF4-FFF2-40B4-BE49-F238E27FC236}">
-                    <a16:creationId xmlns:a16="http://schemas.microsoft.com/office/drawing/2014/main" id="{071192AE-575C-C443-84ED-060AE85A6C46}"/>
+                    <a16:creationId xmlns:a16="http://schemas.microsoft.com/office/drawing/2014/main" xmlns="" id="{071192AE-575C-C443-84ED-060AE85A6C46}"/>
                   </a:ext>
                 </a:extLst>
               </p:cNvPr>
@@ -5122,7 +5110,7 @@
             </p:txBody>
           </p:sp>
         </mc:Choice>
-        <mc:Fallback>
+        <mc:Fallback xmlns="">
           <p:sp>
             <p:nvSpPr>
               <p:cNvPr id="2" name="Rectangle 1">
@@ -5197,14 +5185,14 @@
           <a:chExt cx="0" cy="0"/>
         </a:xfrm>
       </p:grpSpPr>
-      <mc:AlternateContent xmlns:mc="http://schemas.openxmlformats.org/markup-compatibility/2006">
-        <mc:Choice xmlns:a14="http://schemas.microsoft.com/office/drawing/2010/main" Requires="a14">
+      <mc:AlternateContent xmlns:mc="http://schemas.openxmlformats.org/markup-compatibility/2006" xmlns:a14="http://schemas.microsoft.com/office/drawing/2010/main">
+        <mc:Choice Requires="a14">
           <p:sp>
             <p:nvSpPr>
               <p:cNvPr id="2" name="Rectangle 1">
                 <a:extLst>
                   <a:ext uri="{FF2B5EF4-FFF2-40B4-BE49-F238E27FC236}">
-                    <a16:creationId xmlns:a16="http://schemas.microsoft.com/office/drawing/2014/main" id="{071192AE-575C-C443-84ED-060AE85A6C46}"/>
+                    <a16:creationId xmlns:a16="http://schemas.microsoft.com/office/drawing/2014/main" xmlns="" id="{071192AE-575C-C443-84ED-060AE85A6C46}"/>
                   </a:ext>
                 </a:extLst>
               </p:cNvPr>
@@ -5460,7 +5448,7 @@
                         <m:dPr>
                           <m:ctrlPr>
                             <a:rPr lang="en-US" sz="2800" b="1" i="1" smtClean="0">
-                              <a:latin typeface="Cambria Math" panose="02040503050406030204" pitchFamily="18" charset="0"/>
+                              <a:latin typeface="Cambria Math"/>
                               <a:ea typeface="Calibri" panose="020F0502020204030204" pitchFamily="34" charset="0"/>
                               <a:cs typeface="Arial" panose="020B0604020202020204" pitchFamily="34" charset="0"/>
                             </a:rPr>
@@ -5513,7 +5501,7 @@
                         <m:dPr>
                           <m:ctrlPr>
                             <a:rPr lang="en-US" sz="2800" b="1" i="1" smtClean="0">
-                              <a:latin typeface="Cambria Math" panose="02040503050406030204" pitchFamily="18" charset="0"/>
+                              <a:latin typeface="Cambria Math"/>
                               <a:ea typeface="Calibri" panose="020F0502020204030204" pitchFamily="34" charset="0"/>
                               <a:cs typeface="Arial" panose="020B0604020202020204" pitchFamily="34" charset="0"/>
                             </a:rPr>
@@ -5692,7 +5680,7 @@
             </p:txBody>
           </p:sp>
         </mc:Choice>
-        <mc:Fallback>
+        <mc:Fallback xmlns="">
           <p:sp>
             <p:nvSpPr>
               <p:cNvPr id="2" name="Rectangle 1">
@@ -5767,14 +5755,14 @@
           <a:chExt cx="0" cy="0"/>
         </a:xfrm>
       </p:grpSpPr>
-      <mc:AlternateContent xmlns:mc="http://schemas.openxmlformats.org/markup-compatibility/2006">
-        <mc:Choice xmlns:a14="http://schemas.microsoft.com/office/drawing/2010/main" Requires="a14">
+      <mc:AlternateContent xmlns:mc="http://schemas.openxmlformats.org/markup-compatibility/2006" xmlns:a14="http://schemas.microsoft.com/office/drawing/2010/main">
+        <mc:Choice Requires="a14">
           <p:sp>
             <p:nvSpPr>
               <p:cNvPr id="2" name="Rectangle 1">
                 <a:extLst>
                   <a:ext uri="{FF2B5EF4-FFF2-40B4-BE49-F238E27FC236}">
-                    <a16:creationId xmlns:a16="http://schemas.microsoft.com/office/drawing/2014/main" id="{071192AE-575C-C443-84ED-060AE85A6C46}"/>
+                    <a16:creationId xmlns:a16="http://schemas.microsoft.com/office/drawing/2014/main" xmlns="" id="{071192AE-575C-C443-84ED-060AE85A6C46}"/>
                   </a:ext>
                 </a:extLst>
               </p:cNvPr>
@@ -6324,7 +6312,7 @@
             </p:txBody>
           </p:sp>
         </mc:Choice>
-        <mc:Fallback>
+        <mc:Fallback xmlns="">
           <p:sp>
             <p:nvSpPr>
               <p:cNvPr id="2" name="Rectangle 1">
@@ -6399,14 +6387,14 @@
           <a:chExt cx="0" cy="0"/>
         </a:xfrm>
       </p:grpSpPr>
-      <mc:AlternateContent xmlns:mc="http://schemas.openxmlformats.org/markup-compatibility/2006">
-        <mc:Choice xmlns:a14="http://schemas.microsoft.com/office/drawing/2010/main" Requires="a14">
+      <mc:AlternateContent xmlns:mc="http://schemas.openxmlformats.org/markup-compatibility/2006" xmlns:a14="http://schemas.microsoft.com/office/drawing/2010/main">
+        <mc:Choice Requires="a14">
           <p:sp>
             <p:nvSpPr>
               <p:cNvPr id="2" name="Rectangle 1">
                 <a:extLst>
                   <a:ext uri="{FF2B5EF4-FFF2-40B4-BE49-F238E27FC236}">
-                    <a16:creationId xmlns:a16="http://schemas.microsoft.com/office/drawing/2014/main" id="{071192AE-575C-C443-84ED-060AE85A6C46}"/>
+                    <a16:creationId xmlns:a16="http://schemas.microsoft.com/office/drawing/2014/main" xmlns="" id="{071192AE-575C-C443-84ED-060AE85A6C46}"/>
                   </a:ext>
                 </a:extLst>
               </p:cNvPr>
@@ -6611,7 +6599,7 @@
                         <m:fPr>
                           <m:ctrlPr>
                             <a:rPr lang="en-US" sz="2800" b="1" i="1" smtClean="0">
-                              <a:latin typeface="Cambria Math" panose="02040503050406030204" pitchFamily="18" charset="0"/>
+                              <a:latin typeface="Cambria Math"/>
                               <a:cs typeface="Arial" panose="020B0604020202020204" pitchFamily="34" charset="0"/>
                             </a:rPr>
                           </m:ctrlPr>
@@ -6671,7 +6659,7 @@
                         <m:fPr>
                           <m:ctrlPr>
                             <a:rPr lang="en-US" sz="2800" b="1" i="1" smtClean="0">
-                              <a:latin typeface="Cambria Math" panose="02040503050406030204" pitchFamily="18" charset="0"/>
+                              <a:latin typeface="Cambria Math"/>
                               <a:cs typeface="Arial" panose="020B0604020202020204" pitchFamily="34" charset="0"/>
                             </a:rPr>
                           </m:ctrlPr>
@@ -6875,7 +6863,7 @@
             </p:txBody>
           </p:sp>
         </mc:Choice>
-        <mc:Fallback>
+        <mc:Fallback xmlns="">
           <p:sp>
             <p:nvSpPr>
               <p:cNvPr id="2" name="Rectangle 1">
@@ -6950,14 +6938,14 @@
           <a:chExt cx="0" cy="0"/>
         </a:xfrm>
       </p:grpSpPr>
-      <mc:AlternateContent xmlns:mc="http://schemas.openxmlformats.org/markup-compatibility/2006">
-        <mc:Choice xmlns:a14="http://schemas.microsoft.com/office/drawing/2010/main" Requires="a14">
+      <mc:AlternateContent xmlns:mc="http://schemas.openxmlformats.org/markup-compatibility/2006" xmlns:a14="http://schemas.microsoft.com/office/drawing/2010/main">
+        <mc:Choice Requires="a14">
           <p:sp>
             <p:nvSpPr>
               <p:cNvPr id="2" name="Rectangle 1">
                 <a:extLst>
                   <a:ext uri="{FF2B5EF4-FFF2-40B4-BE49-F238E27FC236}">
-                    <a16:creationId xmlns:a16="http://schemas.microsoft.com/office/drawing/2014/main" id="{071192AE-575C-C443-84ED-060AE85A6C46}"/>
+                    <a16:creationId xmlns:a16="http://schemas.microsoft.com/office/drawing/2014/main" xmlns="" id="{071192AE-575C-C443-84ED-060AE85A6C46}"/>
                   </a:ext>
                 </a:extLst>
               </p:cNvPr>
@@ -7001,7 +6989,7 @@
                       <m:fPr>
                         <m:ctrlPr>
                           <a:rPr lang="en-US" sz="2800" b="1" i="1" smtClean="0">
-                            <a:latin typeface="Cambria Math" panose="02040503050406030204" pitchFamily="18" charset="0"/>
+                            <a:latin typeface="Cambria Math"/>
                             <a:cs typeface="Arial" panose="020B0604020202020204" pitchFamily="34" charset="0"/>
                           </a:rPr>
                         </m:ctrlPr>
@@ -7037,7 +7025,7 @@
                       <m:fPr>
                         <m:ctrlPr>
                           <a:rPr lang="en-US" sz="2800" b="1" i="1" smtClean="0">
-                            <a:latin typeface="Cambria Math" panose="02040503050406030204" pitchFamily="18" charset="0"/>
+                            <a:latin typeface="Cambria Math"/>
                             <a:cs typeface="Arial" panose="020B0604020202020204" pitchFamily="34" charset="0"/>
                           </a:rPr>
                         </m:ctrlPr>
@@ -7126,7 +7114,7 @@
                       <m:fPr>
                         <m:ctrlPr>
                           <a:rPr lang="en-US" sz="2800" b="1" i="1" dirty="0" smtClean="0">
-                            <a:latin typeface="Cambria Math" panose="02040503050406030204" pitchFamily="18" charset="0"/>
+                            <a:latin typeface="Cambria Math"/>
                             <a:cs typeface="Arial" panose="020B0604020202020204" pitchFamily="34" charset="0"/>
                           </a:rPr>
                         </m:ctrlPr>
@@ -7199,7 +7187,7 @@
                         <m:fPr>
                           <m:ctrlPr>
                             <a:rPr lang="en-US" sz="2800" b="1" i="1" smtClean="0">
-                              <a:latin typeface="Cambria Math" panose="02040503050406030204" pitchFamily="18" charset="0"/>
+                              <a:latin typeface="Cambria Math"/>
                               <a:cs typeface="Arial" panose="020B0604020202020204" pitchFamily="34" charset="0"/>
                             </a:rPr>
                           </m:ctrlPr>
@@ -7235,7 +7223,7 @@
                         <m:fPr>
                           <m:ctrlPr>
                             <a:rPr lang="en-US" sz="2800" b="1" i="1">
-                              <a:latin typeface="Cambria Math" panose="02040503050406030204" pitchFamily="18" charset="0"/>
+                              <a:latin typeface="Cambria Math"/>
                               <a:cs typeface="Arial" panose="020B0604020202020204" pitchFamily="34" charset="0"/>
                             </a:rPr>
                           </m:ctrlPr>
@@ -7271,7 +7259,7 @@
                         <m:fPr>
                           <m:ctrlPr>
                             <a:rPr lang="en-US" sz="2800" b="1" i="1" smtClean="0">
-                              <a:latin typeface="Cambria Math" panose="02040503050406030204" pitchFamily="18" charset="0"/>
+                              <a:latin typeface="Cambria Math"/>
                               <a:cs typeface="Arial" panose="020B0604020202020204" pitchFamily="34" charset="0"/>
                             </a:rPr>
                           </m:ctrlPr>
@@ -7307,7 +7295,7 @@
                         <m:fPr>
                           <m:ctrlPr>
                             <a:rPr lang="en-US" sz="2800" b="1" i="1">
-                              <a:latin typeface="Cambria Math" panose="02040503050406030204" pitchFamily="18" charset="0"/>
+                              <a:latin typeface="Cambria Math"/>
                               <a:cs typeface="Arial" panose="020B0604020202020204" pitchFamily="34" charset="0"/>
                             </a:rPr>
                           </m:ctrlPr>
@@ -7377,7 +7365,7 @@
                         <m:fPr>
                           <m:ctrlPr>
                             <a:rPr lang="en-US" sz="2800" b="1" i="1" smtClean="0">
-                              <a:latin typeface="Cambria Math" panose="02040503050406030204" pitchFamily="18" charset="0"/>
+                              <a:latin typeface="Cambria Math"/>
                               <a:cs typeface="Arial" panose="020B0604020202020204" pitchFamily="34" charset="0"/>
                             </a:rPr>
                           </m:ctrlPr>
@@ -7463,7 +7451,7 @@
                         <m:fPr>
                           <m:ctrlPr>
                             <a:rPr lang="en-US" sz="2800" b="1" i="1" smtClean="0">
-                              <a:latin typeface="Cambria Math" panose="02040503050406030204" pitchFamily="18" charset="0"/>
+                              <a:latin typeface="Cambria Math"/>
                               <a:cs typeface="Arial" panose="020B0604020202020204" pitchFamily="34" charset="0"/>
                             </a:rPr>
                           </m:ctrlPr>
@@ -7555,7 +7543,7 @@
             </p:txBody>
           </p:sp>
         </mc:Choice>
-        <mc:Fallback>
+        <mc:Fallback xmlns="">
           <p:sp>
             <p:nvSpPr>
               <p:cNvPr id="2" name="Rectangle 1">
@@ -7630,14 +7618,14 @@
           <a:chExt cx="0" cy="0"/>
         </a:xfrm>
       </p:grpSpPr>
-      <mc:AlternateContent xmlns:mc="http://schemas.openxmlformats.org/markup-compatibility/2006">
-        <mc:Choice xmlns:a14="http://schemas.microsoft.com/office/drawing/2010/main" Requires="a14">
+      <mc:AlternateContent xmlns:mc="http://schemas.openxmlformats.org/markup-compatibility/2006" xmlns:a14="http://schemas.microsoft.com/office/drawing/2010/main">
+        <mc:Choice Requires="a14">
           <p:sp>
             <p:nvSpPr>
               <p:cNvPr id="2" name="Rectangle 1">
                 <a:extLst>
                   <a:ext uri="{FF2B5EF4-FFF2-40B4-BE49-F238E27FC236}">
-                    <a16:creationId xmlns:a16="http://schemas.microsoft.com/office/drawing/2014/main" id="{071192AE-575C-C443-84ED-060AE85A6C46}"/>
+                    <a16:creationId xmlns:a16="http://schemas.microsoft.com/office/drawing/2014/main" xmlns="" id="{071192AE-575C-C443-84ED-060AE85A6C46}"/>
                   </a:ext>
                 </a:extLst>
               </p:cNvPr>
@@ -8118,7 +8106,7 @@
             </p:txBody>
           </p:sp>
         </mc:Choice>
-        <mc:Fallback>
+        <mc:Fallback xmlns="">
           <p:sp>
             <p:nvSpPr>
               <p:cNvPr id="2" name="Rectangle 1">
@@ -8193,14 +8181,14 @@
           <a:chExt cx="0" cy="0"/>
         </a:xfrm>
       </p:grpSpPr>
-      <mc:AlternateContent xmlns:mc="http://schemas.openxmlformats.org/markup-compatibility/2006">
-        <mc:Choice xmlns:a14="http://schemas.microsoft.com/office/drawing/2010/main" Requires="a14">
+      <mc:AlternateContent xmlns:mc="http://schemas.openxmlformats.org/markup-compatibility/2006" xmlns:a14="http://schemas.microsoft.com/office/drawing/2010/main">
+        <mc:Choice Requires="a14">
           <p:sp>
             <p:nvSpPr>
               <p:cNvPr id="2" name="Rectangle 1">
                 <a:extLst>
                   <a:ext uri="{FF2B5EF4-FFF2-40B4-BE49-F238E27FC236}">
-                    <a16:creationId xmlns:a16="http://schemas.microsoft.com/office/drawing/2014/main" id="{071192AE-575C-C443-84ED-060AE85A6C46}"/>
+                    <a16:creationId xmlns:a16="http://schemas.microsoft.com/office/drawing/2014/main" xmlns="" id="{071192AE-575C-C443-84ED-060AE85A6C46}"/>
                   </a:ext>
                 </a:extLst>
               </p:cNvPr>
@@ -8444,7 +8432,7 @@
             </p:txBody>
           </p:sp>
         </mc:Choice>
-        <mc:Fallback>
+        <mc:Fallback xmlns="">
           <p:sp>
             <p:nvSpPr>
               <p:cNvPr id="2" name="Rectangle 1">
@@ -8519,14 +8507,14 @@
           <a:chExt cx="0" cy="0"/>
         </a:xfrm>
       </p:grpSpPr>
-      <mc:AlternateContent xmlns:mc="http://schemas.openxmlformats.org/markup-compatibility/2006">
-        <mc:Choice xmlns:a14="http://schemas.microsoft.com/office/drawing/2010/main" Requires="a14">
+      <mc:AlternateContent xmlns:mc="http://schemas.openxmlformats.org/markup-compatibility/2006" xmlns:a14="http://schemas.microsoft.com/office/drawing/2010/main">
+        <mc:Choice Requires="a14">
           <p:sp>
             <p:nvSpPr>
               <p:cNvPr id="2" name="Rectangle 1">
                 <a:extLst>
                   <a:ext uri="{FF2B5EF4-FFF2-40B4-BE49-F238E27FC236}">
-                    <a16:creationId xmlns:a16="http://schemas.microsoft.com/office/drawing/2014/main" id="{071192AE-575C-C443-84ED-060AE85A6C46}"/>
+                    <a16:creationId xmlns:a16="http://schemas.microsoft.com/office/drawing/2014/main" xmlns="" id="{071192AE-575C-C443-84ED-060AE85A6C46}"/>
                   </a:ext>
                 </a:extLst>
               </p:cNvPr>
@@ -9204,7 +9192,7 @@
                         <m:fPr>
                           <m:ctrlPr>
                             <a:rPr lang="en-US" sz="2800" b="1" i="1" smtClean="0">
-                              <a:latin typeface="Cambria Math" panose="02040503050406030204" pitchFamily="18" charset="0"/>
+                              <a:latin typeface="Cambria Math"/>
                               <a:cs typeface="Arial" panose="020B0604020202020204" pitchFamily="34" charset="0"/>
                             </a:rPr>
                           </m:ctrlPr>
@@ -9318,7 +9306,7 @@
             </p:txBody>
           </p:sp>
         </mc:Choice>
-        <mc:Fallback>
+        <mc:Fallback xmlns="">
           <p:sp>
             <p:nvSpPr>
               <p:cNvPr id="2" name="Rectangle 1">
@@ -9631,7 +9619,7 @@
   <a:extraClrSchemeLst/>
   <a:extLst>
     <a:ext uri="{05A4C25C-085E-4340-85A3-A5531E510DB2}">
-      <thm15:themeFamily xmlns:thm15="http://schemas.microsoft.com/office/thememl/2012/main" name="Office Theme" id="{62F939B6-93AF-4DB8-9C6B-D6C7DFDC589F}" vid="{4A3C46E8-61CC-4603-A589-7422A47A8E4A}"/>
+      <thm15:themeFamily xmlns:thm15="http://schemas.microsoft.com/office/thememl/2012/main" xmlns="" name="Office Theme" id="{62F939B6-93AF-4DB8-9C6B-D6C7DFDC589F}" vid="{4A3C46E8-61CC-4603-A589-7422A47A8E4A}"/>
     </a:ext>
   </a:extLst>
 </a:theme>
@@ -9892,16 +9880,19 @@
   <a:extraClrSchemeLst/>
   <a:extLst>
     <a:ext uri="{05A4C25C-085E-4340-85A3-A5531E510DB2}">
-      <thm15:themeFamily xmlns:thm15="http://schemas.microsoft.com/office/thememl/2012/main" name="Office Theme" id="{62F939B6-93AF-4DB8-9C6B-D6C7DFDC589F}" vid="{4A3C46E8-61CC-4603-A589-7422A47A8E4A}"/>
+      <thm15:themeFamily xmlns:thm15="http://schemas.microsoft.com/office/thememl/2012/main" xmlns="" name="Office Theme" id="{62F939B6-93AF-4DB8-9C6B-D6C7DFDC589F}" vid="{4A3C46E8-61CC-4603-A589-7422A47A8E4A}"/>
     </a:ext>
   </a:extLst>
 </a:theme>
 </file>
 
 <file path=customXml/item1.xml><?xml version="1.0" encoding="utf-8"?>
-<p:properties xmlns:p="http://schemas.microsoft.com/office/2006/metadata/properties" xmlns:xsi="http://www.w3.org/2001/XMLSchema-instance" xmlns:pc="http://schemas.microsoft.com/office/infopath/2007/PartnerControls">
-  <documentManagement/>
-</p:properties>
+<?mso-contentType ?>
+<FormTemplates xmlns="http://schemas.microsoft.com/sharepoint/v3/contenttype/forms">
+  <Display>DocumentLibraryForm</Display>
+  <Edit>DocumentLibraryForm</Edit>
+  <New>DocumentLibraryForm</New>
+</FormTemplates>
 </file>
 
 <file path=customXml/item2.xml><?xml version="1.0" encoding="utf-8"?>
@@ -10043,19 +10034,15 @@
 </file>
 
 <file path=customXml/item3.xml><?xml version="1.0" encoding="utf-8"?>
-<?mso-contentType ?>
-<FormTemplates xmlns="http://schemas.microsoft.com/sharepoint/v3/contenttype/forms">
-  <Display>DocumentLibraryForm</Display>
-  <Edit>DocumentLibraryForm</Edit>
-  <New>DocumentLibraryForm</New>
-</FormTemplates>
+<p:properties xmlns:p="http://schemas.microsoft.com/office/2006/metadata/properties" xmlns:xsi="http://www.w3.org/2001/XMLSchema-instance" xmlns:pc="http://schemas.microsoft.com/office/infopath/2007/PartnerControls">
+  <documentManagement/>
+</p:properties>
 </file>
 
 <file path=customXml/itemProps1.xml><?xml version="1.0" encoding="utf-8"?>
-<ds:datastoreItem xmlns:ds="http://schemas.openxmlformats.org/officeDocument/2006/customXml" ds:itemID="{1805F6C0-B9D0-4137-8075-171A1F93BFCE}">
+<ds:datastoreItem xmlns:ds="http://schemas.openxmlformats.org/officeDocument/2006/customXml" ds:itemID="{97758CBF-78B8-421D-8207-4FD0F562F317}">
   <ds:schemaRefs>
-    <ds:schemaRef ds:uri="http://schemas.microsoft.com/office/2006/metadata/properties"/>
-    <ds:schemaRef ds:uri="http://schemas.microsoft.com/office/infopath/2007/PartnerControls"/>
+    <ds:schemaRef ds:uri="http://schemas.microsoft.com/sharepoint/v3/contenttype/forms"/>
   </ds:schemaRefs>
 </ds:datastoreItem>
 </file>
@@ -10079,9 +10066,10 @@
 </file>
 
 <file path=customXml/itemProps3.xml><?xml version="1.0" encoding="utf-8"?>
-<ds:datastoreItem xmlns:ds="http://schemas.openxmlformats.org/officeDocument/2006/customXml" ds:itemID="{97758CBF-78B8-421D-8207-4FD0F562F317}">
+<ds:datastoreItem xmlns:ds="http://schemas.openxmlformats.org/officeDocument/2006/customXml" ds:itemID="{1805F6C0-B9D0-4137-8075-171A1F93BFCE}">
   <ds:schemaRefs>
-    <ds:schemaRef ds:uri="http://schemas.microsoft.com/sharepoint/v3/contenttype/forms"/>
+    <ds:schemaRef ds:uri="http://schemas.microsoft.com/office/2006/metadata/properties"/>
+    <ds:schemaRef ds:uri="http://schemas.microsoft.com/office/infopath/2007/PartnerControls"/>
   </ds:schemaRefs>
 </ds:datastoreItem>
 </file>
</xml_diff>